<commit_message>
commit for pasayatpravat 2.0
</commit_message>
<xml_diff>
--- a/Final_Presentation_PM.pptx
+++ b/Final_Presentation_PM.pptx
@@ -4547,7 +4547,7 @@
           <a:p>
             <a:fld id="{94B6296C-3B6C-440B-9577-6B47ED23061F}" type="datetimeFigureOut">
               <a:rPr lang="nl-NL" smtClean="0"/>
-              <a:t>9-3-2020</a:t>
+              <a:t>10-3-2020</a:t>
             </a:fld>
             <a:endParaRPr lang="nl-NL"/>
           </a:p>
@@ -5130,13 +5130,8 @@
             </a:pPr>
             <a:r>
               <a:rPr lang="en-US" b="1" dirty="0" smtClean="0"/>
-              <a:t>Outlier analysis of ‘TRIP </a:t>
-            </a:r>
-            <a:r>
-              <a:rPr lang="en-US" b="1" dirty="0" smtClean="0"/>
-              <a:t>DURATION’</a:t>
-            </a:r>
-            <a:endParaRPr lang="en-US" b="1" dirty="0" smtClean="0"/>
+              <a:t>Outlier analysis of ‘TRIP DURATION’</a:t>
+            </a:r>
           </a:p>
           <a:p>
             <a:r>
@@ -6509,7 +6504,7 @@
           <a:p>
             <a:fld id="{19A45034-FD8A-4DDB-B0E0-C170850ED750}" type="datetimeFigureOut">
               <a:rPr lang="nl-NL" smtClean="0"/>
-              <a:t>9-3-2020</a:t>
+              <a:t>10-3-2020</a:t>
             </a:fld>
             <a:endParaRPr lang="nl-NL"/>
           </a:p>
@@ -6945,7 +6940,7 @@
           <a:p>
             <a:fld id="{19A45034-FD8A-4DDB-B0E0-C170850ED750}" type="datetimeFigureOut">
               <a:rPr lang="nl-NL" smtClean="0"/>
-              <a:t>9-3-2020</a:t>
+              <a:t>10-3-2020</a:t>
             </a:fld>
             <a:endParaRPr lang="nl-NL"/>
           </a:p>
@@ -7195,7 +7190,7 @@
           <a:p>
             <a:fld id="{19A45034-FD8A-4DDB-B0E0-C170850ED750}" type="datetimeFigureOut">
               <a:rPr lang="nl-NL" smtClean="0"/>
-              <a:t>9-3-2020</a:t>
+              <a:t>10-3-2020</a:t>
             </a:fld>
             <a:endParaRPr lang="nl-NL"/>
           </a:p>
@@ -7503,7 +7498,7 @@
           <a:p>
             <a:fld id="{19A45034-FD8A-4DDB-B0E0-C170850ED750}" type="datetimeFigureOut">
               <a:rPr lang="nl-NL" smtClean="0"/>
-              <a:t>9-3-2020</a:t>
+              <a:t>10-3-2020</a:t>
             </a:fld>
             <a:endParaRPr lang="nl-NL"/>
           </a:p>
@@ -7821,7 +7816,7 @@
           <a:p>
             <a:fld id="{19A45034-FD8A-4DDB-B0E0-C170850ED750}" type="datetimeFigureOut">
               <a:rPr lang="nl-NL" smtClean="0"/>
-              <a:t>9-3-2020</a:t>
+              <a:t>10-3-2020</a:t>
             </a:fld>
             <a:endParaRPr lang="nl-NL"/>
           </a:p>
@@ -8123,7 +8118,7 @@
           <a:p>
             <a:fld id="{19A45034-FD8A-4DDB-B0E0-C170850ED750}" type="datetimeFigureOut">
               <a:rPr lang="nl-NL" smtClean="0"/>
-              <a:t>9-3-2020</a:t>
+              <a:t>10-3-2020</a:t>
             </a:fld>
             <a:endParaRPr lang="nl-NL"/>
           </a:p>
@@ -8490,7 +8485,7 @@
           <a:p>
             <a:fld id="{19A45034-FD8A-4DDB-B0E0-C170850ED750}" type="datetimeFigureOut">
               <a:rPr lang="nl-NL" smtClean="0"/>
-              <a:t>9-3-2020</a:t>
+              <a:t>10-3-2020</a:t>
             </a:fld>
             <a:endParaRPr lang="nl-NL"/>
           </a:p>
@@ -8664,7 +8659,7 @@
           <a:p>
             <a:fld id="{19A45034-FD8A-4DDB-B0E0-C170850ED750}" type="datetimeFigureOut">
               <a:rPr lang="nl-NL" smtClean="0"/>
-              <a:t>9-3-2020</a:t>
+              <a:t>10-3-2020</a:t>
             </a:fld>
             <a:endParaRPr lang="nl-NL"/>
           </a:p>
@@ -8844,7 +8839,7 @@
           <a:p>
             <a:fld id="{19A45034-FD8A-4DDB-B0E0-C170850ED750}" type="datetimeFigureOut">
               <a:rPr lang="nl-NL" smtClean="0"/>
-              <a:t>9-3-2020</a:t>
+              <a:t>10-3-2020</a:t>
             </a:fld>
             <a:endParaRPr lang="nl-NL"/>
           </a:p>
@@ -9014,7 +9009,7 @@
           <a:p>
             <a:fld id="{19A45034-FD8A-4DDB-B0E0-C170850ED750}" type="datetimeFigureOut">
               <a:rPr lang="nl-NL" smtClean="0"/>
-              <a:t>9-3-2020</a:t>
+              <a:t>10-3-2020</a:t>
             </a:fld>
             <a:endParaRPr lang="nl-NL"/>
           </a:p>
@@ -9264,7 +9259,7 @@
           <a:p>
             <a:fld id="{19A45034-FD8A-4DDB-B0E0-C170850ED750}" type="datetimeFigureOut">
               <a:rPr lang="nl-NL" smtClean="0"/>
-              <a:t>9-3-2020</a:t>
+              <a:t>10-3-2020</a:t>
             </a:fld>
             <a:endParaRPr lang="nl-NL"/>
           </a:p>
@@ -9500,7 +9495,7 @@
           <a:p>
             <a:fld id="{19A45034-FD8A-4DDB-B0E0-C170850ED750}" type="datetimeFigureOut">
               <a:rPr lang="nl-NL" smtClean="0"/>
-              <a:t>9-3-2020</a:t>
+              <a:t>10-3-2020</a:t>
             </a:fld>
             <a:endParaRPr lang="nl-NL"/>
           </a:p>
@@ -9882,7 +9877,7 @@
           <a:p>
             <a:fld id="{19A45034-FD8A-4DDB-B0E0-C170850ED750}" type="datetimeFigureOut">
               <a:rPr lang="nl-NL" smtClean="0"/>
-              <a:t>9-3-2020</a:t>
+              <a:t>10-3-2020</a:t>
             </a:fld>
             <a:endParaRPr lang="nl-NL"/>
           </a:p>
@@ -10000,7 +9995,7 @@
           <a:p>
             <a:fld id="{19A45034-FD8A-4DDB-B0E0-C170850ED750}" type="datetimeFigureOut">
               <a:rPr lang="nl-NL" smtClean="0"/>
-              <a:t>9-3-2020</a:t>
+              <a:t>10-3-2020</a:t>
             </a:fld>
             <a:endParaRPr lang="nl-NL"/>
           </a:p>
@@ -10095,7 +10090,7 @@
           <a:p>
             <a:fld id="{19A45034-FD8A-4DDB-B0E0-C170850ED750}" type="datetimeFigureOut">
               <a:rPr lang="nl-NL" smtClean="0"/>
-              <a:t>9-3-2020</a:t>
+              <a:t>10-3-2020</a:t>
             </a:fld>
             <a:endParaRPr lang="nl-NL"/>
           </a:p>
@@ -10350,7 +10345,7 @@
           <a:p>
             <a:fld id="{19A45034-FD8A-4DDB-B0E0-C170850ED750}" type="datetimeFigureOut">
               <a:rPr lang="nl-NL" smtClean="0"/>
-              <a:t>9-3-2020</a:t>
+              <a:t>10-3-2020</a:t>
             </a:fld>
             <a:endParaRPr lang="nl-NL"/>
           </a:p>
@@ -10633,7 +10628,7 @@
           <a:p>
             <a:fld id="{19A45034-FD8A-4DDB-B0E0-C170850ED750}" type="datetimeFigureOut">
               <a:rPr lang="nl-NL" smtClean="0"/>
-              <a:t>9-3-2020</a:t>
+              <a:t>10-3-2020</a:t>
             </a:fld>
             <a:endParaRPr lang="nl-NL"/>
           </a:p>
@@ -11039,7 +11034,7 @@
           <a:p>
             <a:fld id="{19A45034-FD8A-4DDB-B0E0-C170850ED750}" type="datetimeFigureOut">
               <a:rPr lang="nl-NL" smtClean="0"/>
-              <a:t>9-3-2020</a:t>
+              <a:t>10-3-2020</a:t>
             </a:fld>
             <a:endParaRPr lang="nl-NL"/>
           </a:p>
@@ -11627,29 +11622,8 @@
                   <a:schemeClr val="tx1"/>
                 </a:solidFill>
               </a:rPr>
-              <a:t>Data Science Assessment </a:t>
-            </a:r>
-            <a:r>
-              <a:rPr lang="en-US" sz="3200" b="1" dirty="0" smtClean="0">
-                <a:solidFill>
-                  <a:schemeClr val="tx1"/>
-                </a:solidFill>
-              </a:rPr>
-              <a:t>– </a:t>
-            </a:r>
-            <a:r>
-              <a:rPr lang="en-US" sz="3200" b="1" dirty="0" smtClean="0">
-                <a:solidFill>
-                  <a:schemeClr val="tx1"/>
-                </a:solidFill>
-              </a:rPr>
-              <a:t>Taxi Mobility</a:t>
-            </a:r>
-            <a:endParaRPr lang="en-US" sz="3200" b="1" dirty="0" smtClean="0">
-              <a:solidFill>
-                <a:schemeClr val="tx1"/>
-              </a:solidFill>
-            </a:endParaRPr>
+              <a:t>Data Science Assessment – Taxi Mobility</a:t>
+            </a:r>
           </a:p>
           <a:p>
             <a:pPr algn="ctr"/>
@@ -11750,11 +11724,7 @@
             <a:pPr marL="0" lvl="2"/>
             <a:r>
               <a:rPr lang="en-US" sz="2000" b="1" u="sng" dirty="0" smtClean="0"/>
-              <a:t>Data preparation</a:t>
-            </a:r>
-            <a:r>
-              <a:rPr lang="en-US" sz="2000" b="1" u="sng" dirty="0" smtClean="0"/>
-              <a:t>:</a:t>
+              <a:t>Data preparation:</a:t>
             </a:r>
           </a:p>
           <a:p>
@@ -12305,7 +12275,6 @@
               <a:rPr lang="en-US" sz="1600" dirty="0" smtClean="0"/>
               <a:t>).</a:t>
             </a:r>
-            <a:endParaRPr lang="en-US" sz="1600" dirty="0" smtClean="0"/>
           </a:p>
         </p:txBody>
       </p:sp>
@@ -12371,11 +12340,7 @@
             <a:pPr marL="0" lvl="2"/>
             <a:r>
               <a:rPr lang="en-US" sz="2000" b="1" u="sng" dirty="0" smtClean="0"/>
-              <a:t>Data transformation</a:t>
-            </a:r>
-            <a:r>
-              <a:rPr lang="en-US" sz="2000" b="1" u="sng" dirty="0" smtClean="0"/>
-              <a:t>:</a:t>
+              <a:t>Data transformation:</a:t>
             </a:r>
           </a:p>
           <a:p>
@@ -13342,11 +13307,7 @@
             </a:r>
             <a:r>
               <a:rPr lang="en-US" sz="3200" b="1" dirty="0" smtClean="0"/>
-              <a:t>. </a:t>
-            </a:r>
-            <a:r>
-              <a:rPr lang="en-US" sz="3200" b="1" dirty="0" smtClean="0"/>
-              <a:t>Predictor for taxi drivers</a:t>
+              <a:t>. Predictor for taxi drivers</a:t>
             </a:r>
             <a:endParaRPr lang="en-US" sz="3200" b="1" dirty="0"/>
           </a:p>
@@ -13376,11 +13337,7 @@
           <a:p>
             <a:r>
               <a:rPr lang="en-US" sz="2000" b="1" dirty="0" smtClean="0"/>
-              <a:t>Goal</a:t>
-            </a:r>
-            <a:r>
-              <a:rPr lang="en-US" sz="2000" b="1" dirty="0" smtClean="0"/>
-              <a:t>: </a:t>
+              <a:t>Goal: </a:t>
             </a:r>
           </a:p>
           <a:p>
@@ -13390,15 +13347,7 @@
             </a:pPr>
             <a:r>
               <a:rPr lang="en-US" sz="1600" dirty="0" smtClean="0"/>
-              <a:t>Become </a:t>
-            </a:r>
-            <a:r>
-              <a:rPr lang="en-US" sz="1600" dirty="0" smtClean="0"/>
-              <a:t>more environmentally sustainable </a:t>
-            </a:r>
-            <a:r>
-              <a:rPr lang="en-US" sz="1600" dirty="0" smtClean="0"/>
-              <a:t>by “</a:t>
+              <a:t>Become more environmentally sustainable by “</a:t>
             </a:r>
             <a:r>
               <a:rPr lang="en-US" sz="1600" b="1" dirty="0" smtClean="0"/>
@@ -13418,7 +13367,6 @@
               <a:rPr lang="en-US" sz="1600" dirty="0" smtClean="0"/>
               <a:t>How can we help drivers become more energy efficient by advising them on cab demand?</a:t>
             </a:r>
-            <a:endParaRPr lang="en-US" sz="1600" dirty="0" smtClean="0"/>
           </a:p>
           <a:p>
             <a:pPr lvl="2"/>
@@ -13754,11 +13702,7 @@
             <a:pPr marL="0" lvl="2"/>
             <a:r>
               <a:rPr lang="en-US" sz="2000" b="1" u="sng" dirty="0" smtClean="0"/>
-              <a:t>Data preparation &amp; Feature engineering</a:t>
-            </a:r>
-            <a:r>
-              <a:rPr lang="en-US" sz="2000" b="1" u="sng" dirty="0" smtClean="0"/>
-              <a:t>:</a:t>
+              <a:t>Data preparation &amp; Feature engineering:</a:t>
             </a:r>
           </a:p>
           <a:p>
@@ -13994,11 +13938,7 @@
             <a:pPr marL="0" lvl="2"/>
             <a:r>
               <a:rPr lang="en-US" sz="2000" b="1" u="sng" dirty="0" smtClean="0"/>
-              <a:t>Data transformation for modeling</a:t>
-            </a:r>
-            <a:r>
-              <a:rPr lang="en-US" sz="2000" b="1" u="sng" dirty="0" smtClean="0"/>
-              <a:t>:</a:t>
+              <a:t>Data transformation for modeling:</a:t>
             </a:r>
           </a:p>
           <a:p>
@@ -14190,7 +14130,7 @@
         <p:spPr>
           <a:xfrm>
             <a:off x="406256" y="756182"/>
-            <a:ext cx="11581429" cy="3908762"/>
+            <a:ext cx="11581429" cy="3662541"/>
           </a:xfrm>
           <a:prstGeom prst="rect">
             <a:avLst/>
@@ -14253,9 +14193,12 @@
             </a:r>
             <a:r>
               <a:rPr lang="en-US" sz="1600" b="1" dirty="0" smtClean="0"/>
-              <a:t>Cross-validation (grid search)</a:t>
-            </a:r>
-            <a:endParaRPr lang="en-US" sz="1600" dirty="0" smtClean="0"/>
+              <a:t>Hyper-parameter optimization </a:t>
+            </a:r>
+            <a:r>
+              <a:rPr lang="en-US" sz="1600" dirty="0" smtClean="0"/>
+              <a:t>(Cross-validation using grid search)</a:t>
+            </a:r>
           </a:p>
           <a:p>
             <a:pPr marL="914400" lvl="3" indent="-457200">
@@ -14268,7 +14211,7 @@
             </a:r>
             <a:r>
               <a:rPr lang="en-US" sz="1600" b="1" dirty="0" smtClean="0"/>
-              <a:t>Previous 5 time-bin observations, Region, Day of week, IsWeekend</a:t>
+              <a:t>Previous 5 time-bin observations, Region, Day of week, IsWeekend, Phase of the day</a:t>
             </a:r>
           </a:p>
           <a:p>
@@ -14325,30 +14268,27 @@
             </a:pPr>
             <a:r>
               <a:rPr lang="en-US" sz="1600" b="1" dirty="0" smtClean="0"/>
-              <a:t>Overfitting</a:t>
+              <a:t>Criteria: </a:t>
             </a:r>
             <a:r>
               <a:rPr lang="en-US" sz="1600" dirty="0" smtClean="0"/>
-              <a:t> on Random Forest</a:t>
-            </a:r>
-            <a:endParaRPr lang="en-US" sz="1600" b="1" dirty="0"/>
-          </a:p>
-          <a:p>
-            <a:pPr marL="914400" lvl="3" indent="-457200">
-              <a:buFont typeface="Wingdings" panose="05000000000000000000" pitchFamily="2" charset="2"/>
-              <a:buChar char="q"/>
-            </a:pPr>
+              <a:t>Model </a:t>
+            </a:r>
+            <a:r>
+              <a:rPr lang="en-US" sz="1600" dirty="0"/>
+              <a:t>o</a:t>
+            </a:r>
             <a:r>
               <a:rPr lang="en-US" sz="1600" dirty="0" smtClean="0"/>
-              <a:t>Linear regression not as good as XGBR</a:t>
-            </a:r>
-            <a:endParaRPr lang="en-US" sz="2000" b="1" u="sng" dirty="0"/>
+              <a:t>verfitting, Test RMSE</a:t>
+            </a:r>
+            <a:endParaRPr lang="en-US" sz="2000" u="sng" dirty="0"/>
           </a:p>
         </p:txBody>
       </p:sp>
       <p:pic>
         <p:nvPicPr>
-          <p:cNvPr id="5" name="Picture 4"/>
+          <p:cNvPr id="2" name="Picture 1"/>
           <p:cNvPicPr>
             <a:picLocks noChangeAspect="1"/>
           </p:cNvPicPr>
@@ -14362,8 +14302,32 @@
         </p:blipFill>
         <p:spPr>
           <a:xfrm>
-            <a:off x="5707464" y="3051503"/>
-            <a:ext cx="6280221" cy="3226882"/>
+            <a:off x="5878286" y="3158738"/>
+            <a:ext cx="5716517" cy="3012411"/>
+          </a:xfrm>
+          <a:prstGeom prst="rect">
+            <a:avLst/>
+          </a:prstGeom>
+        </p:spPr>
+      </p:pic>
+      <p:pic>
+        <p:nvPicPr>
+          <p:cNvPr id="4" name="Picture 3"/>
+          <p:cNvPicPr>
+            <a:picLocks noChangeAspect="1"/>
+          </p:cNvPicPr>
+          <p:nvPr/>
+        </p:nvPicPr>
+        <p:blipFill>
+          <a:blip r:embed="rId4"/>
+          <a:stretch>
+            <a:fillRect/>
+          </a:stretch>
+        </p:blipFill>
+        <p:spPr>
+          <a:xfrm>
+            <a:off x="2250987" y="4592148"/>
+            <a:ext cx="2505075" cy="1190625"/>
           </a:xfrm>
           <a:prstGeom prst="rect">
             <a:avLst/>
@@ -18977,11 +18941,7 @@
             </a:pPr>
             <a:r>
               <a:rPr lang="en-US" sz="1600" dirty="0" smtClean="0"/>
-              <a:t>Optimize </a:t>
-            </a:r>
-            <a:r>
-              <a:rPr lang="en-US" sz="1600" dirty="0" smtClean="0"/>
-              <a:t>the operational aspects</a:t>
+              <a:t>Optimize the operational aspects</a:t>
             </a:r>
           </a:p>
         </p:txBody>
@@ -20099,11 +20059,7 @@
             <a:pPr marL="0" lvl="2"/>
             <a:r>
               <a:rPr lang="en-US" sz="2000" b="1" u="sng" dirty="0" smtClean="0"/>
-              <a:t>EDA</a:t>
-            </a:r>
-            <a:r>
-              <a:rPr lang="en-US" sz="2000" b="1" u="sng" dirty="0" smtClean="0"/>
-              <a:t>:</a:t>
+              <a:t>EDA:</a:t>
             </a:r>
           </a:p>
           <a:p>
@@ -20121,11 +20077,7 @@
             </a:r>
             <a:r>
               <a:rPr lang="en-US" b="1" dirty="0" smtClean="0"/>
-              <a:t>nalysis </a:t>
-            </a:r>
-            <a:r>
-              <a:rPr lang="en-US" b="1" dirty="0" smtClean="0"/>
-              <a:t>of ‘TRIP DISTANCE’</a:t>
+              <a:t>nalysis of ‘TRIP DISTANCE’</a:t>
             </a:r>
             <a:endParaRPr lang="en-US" dirty="0" smtClean="0"/>
           </a:p>
@@ -20565,11 +20517,7 @@
           <a:p>
             <a:r>
               <a:rPr lang="en-US" sz="1600" i="1" dirty="0" smtClean="0"/>
-              <a:t>“An approximate answer to a right question is far better than an right answer to an approximate question.”          </a:t>
-            </a:r>
-            <a:r>
-              <a:rPr lang="en-US" sz="1600" i="1" dirty="0" smtClean="0"/>
-              <a:t>																				</a:t>
+              <a:t>“An approximate answer to a right question is far better than an right answer to an approximate question.”          																				</a:t>
             </a:r>
           </a:p>
           <a:p>
@@ -20579,15 +20527,7 @@
             </a:r>
             <a:r>
               <a:rPr lang="en-US" sz="1600" i="1" dirty="0" smtClean="0"/>
-              <a:t>																			</a:t>
-            </a:r>
-            <a:r>
-              <a:rPr lang="en-US" sz="1600" i="1" dirty="0" smtClean="0"/>
-              <a:t>-- </a:t>
-            </a:r>
-            <a:r>
-              <a:rPr lang="en-US" sz="1600" i="1" dirty="0" smtClean="0"/>
-              <a:t>John Tukey</a:t>
+              <a:t>																			-- John Tukey</a:t>
             </a:r>
           </a:p>
           <a:p>
@@ -20609,11 +20549,7 @@
             </a:pPr>
             <a:r>
               <a:rPr lang="en-US" sz="1600" dirty="0" smtClean="0"/>
-              <a:t>Become </a:t>
-            </a:r>
-            <a:r>
-              <a:rPr lang="en-US" sz="1600" dirty="0" smtClean="0"/>
-              <a:t>more environmentally sustainable through “</a:t>
+              <a:t>Become more environmentally sustainable through “</a:t>
             </a:r>
             <a:r>
               <a:rPr lang="en-US" sz="1600" b="1" dirty="0" smtClean="0"/>
@@ -20621,13 +20557,8 @@
             </a:r>
             <a:r>
               <a:rPr lang="en-US" sz="1600" dirty="0" smtClean="0"/>
-              <a:t>” among </a:t>
-            </a:r>
-            <a:r>
-              <a:rPr lang="en-US" sz="1600" dirty="0" smtClean="0"/>
-              <a:t>drivers </a:t>
-            </a:r>
-            <a:endParaRPr lang="en-US" sz="1600" dirty="0" smtClean="0"/>
+              <a:t>” among drivers </a:t>
+            </a:r>
           </a:p>
           <a:p>
             <a:pPr lvl="2"/>
@@ -20691,13 +20622,8 @@
             </a:r>
             <a:r>
               <a:rPr lang="en-US" sz="1600" dirty="0" smtClean="0"/>
-              <a:t>” - categorize drivers into groups with similar driving </a:t>
-            </a:r>
-            <a:r>
-              <a:rPr lang="en-US" sz="1600" dirty="0" smtClean="0"/>
-              <a:t>behavior</a:t>
-            </a:r>
-            <a:endParaRPr lang="en-US" sz="1600" dirty="0" smtClean="0"/>
+              <a:t>” - categorize drivers into groups with similar driving behavior</a:t>
+            </a:r>
           </a:p>
           <a:p>
             <a:pPr marL="285750" indent="-285750">
@@ -20721,15 +20647,7 @@
             </a:r>
             <a:r>
               <a:rPr lang="en-US" sz="1600" dirty="0" smtClean="0"/>
-              <a:t> Reward, teach or penalize drivers based on </a:t>
-            </a:r>
-            <a:r>
-              <a:rPr lang="en-US" sz="1600" dirty="0" smtClean="0"/>
-              <a:t>their driving </a:t>
-            </a:r>
-            <a:r>
-              <a:rPr lang="en-US" sz="1600" dirty="0" smtClean="0"/>
-              <a:t>behavior</a:t>
+              <a:t> Reward, teach or penalize drivers based on their driving behavior</a:t>
             </a:r>
           </a:p>
           <a:p>

</xml_diff>